<commit_message>
updated slides and comparison notebook
</commit_message>
<xml_diff>
--- a/draft resilience17.pptx
+++ b/draft resilience17.pptx
@@ -164,7 +164,7 @@
   </p:defaultTextStyle>
   <p:extLst>
     <p:ext uri="{EFAFB233-063F-42B5-8137-9DF3F51BA10A}">
-      <p15:sldGuideLst xmlns="" xmlns:p15="http://schemas.microsoft.com/office/powerpoint/2012/main">
+      <p15:sldGuideLst xmlns:p15="http://schemas.microsoft.com/office/powerpoint/2012/main" xmlns="">
         <p15:guide id="1" orient="horz" pos="3072">
           <p15:clr>
             <a:srgbClr val="A4A3A4"/>
@@ -281,7 +281,7 @@
             <a:fld id="{9372FD76-EB9F-764F-8F27-36E8BD5ED777}" type="datetimeFigureOut">
               <a:rPr lang="nl-NL"/>
               <a:pPr/>
-              <a:t>17/08/17</a:t>
+              <a:t>20/08/17</a:t>
             </a:fld>
             <a:endParaRPr lang="nl-NL"/>
           </a:p>
@@ -477,7 +477,7 @@
             <a:fld id="{A801D9F9-3769-E54C-B9DD-B0DA30EEDA23}" type="datetimeFigureOut">
               <a:rPr lang="nl-NL"/>
               <a:pPr/>
-              <a:t>17/08/17</a:t>
+              <a:t>20/08/17</a:t>
             </a:fld>
             <a:endParaRPr lang="nl-NL"/>
           </a:p>
@@ -2124,7 +2124,7 @@
           <a:p>
             <a:fld id="{D88EC65B-D77A-B24E-9703-40BE60F18F63}" type="datetimeFigureOut">
               <a:rPr lang="en-US" smtClean="0"/>
-              <a:t>17/08/17</a:t>
+              <a:t>20/08/17</a:t>
             </a:fld>
             <a:endParaRPr lang="en-US"/>
           </a:p>
@@ -2334,7 +2334,7 @@
           <a:p>
             <a:fld id="{D88EC65B-D77A-B24E-9703-40BE60F18F63}" type="datetimeFigureOut">
               <a:rPr lang="en-US" smtClean="0"/>
-              <a:t>17/08/17</a:t>
+              <a:t>20/08/17</a:t>
             </a:fld>
             <a:endParaRPr lang="en-US"/>
           </a:p>
@@ -2610,7 +2610,7 @@
           <a:p>
             <a:fld id="{D88EC65B-D77A-B24E-9703-40BE60F18F63}" type="datetimeFigureOut">
               <a:rPr lang="en-US" smtClean="0"/>
-              <a:t>17/08/17</a:t>
+              <a:t>20/08/17</a:t>
             </a:fld>
             <a:endParaRPr lang="en-US"/>
           </a:p>
@@ -2936,7 +2936,7 @@
           <a:p>
             <a:fld id="{D88EC65B-D77A-B24E-9703-40BE60F18F63}" type="datetimeFigureOut">
               <a:rPr lang="en-US" smtClean="0"/>
-              <a:t>17/08/17</a:t>
+              <a:t>20/08/17</a:t>
             </a:fld>
             <a:endParaRPr lang="en-US"/>
           </a:p>
@@ -3402,7 +3402,7 @@
           <a:p>
             <a:fld id="{D88EC65B-D77A-B24E-9703-40BE60F18F63}" type="datetimeFigureOut">
               <a:rPr lang="en-US" smtClean="0"/>
-              <a:t>17/08/17</a:t>
+              <a:t>20/08/17</a:t>
             </a:fld>
             <a:endParaRPr lang="en-US"/>
           </a:p>
@@ -3706,7 +3706,7 @@
           <a:p>
             <a:fld id="{D88EC65B-D77A-B24E-9703-40BE60F18F63}" type="datetimeFigureOut">
               <a:rPr lang="en-US" smtClean="0"/>
-              <a:t>17/08/17</a:t>
+              <a:t>20/08/17</a:t>
             </a:fld>
             <a:endParaRPr lang="en-US"/>
           </a:p>
@@ -3825,7 +3825,7 @@
           <a:p>
             <a:fld id="{D88EC65B-D77A-B24E-9703-40BE60F18F63}" type="datetimeFigureOut">
               <a:rPr lang="en-US" smtClean="0"/>
-              <a:t>17/08/17</a:t>
+              <a:t>20/08/17</a:t>
             </a:fld>
             <a:endParaRPr lang="en-US"/>
           </a:p>
@@ -4135,7 +4135,7 @@
           <a:p>
             <a:fld id="{D88EC65B-D77A-B24E-9703-40BE60F18F63}" type="datetimeFigureOut">
               <a:rPr lang="en-US" smtClean="0"/>
-              <a:t>17/08/17</a:t>
+              <a:t>20/08/17</a:t>
             </a:fld>
             <a:endParaRPr lang="en-US"/>
           </a:p>
@@ -4421,7 +4421,7 @@
           <a:p>
             <a:fld id="{D88EC65B-D77A-B24E-9703-40BE60F18F63}" type="datetimeFigureOut">
               <a:rPr lang="en-US" smtClean="0"/>
-              <a:t>17/08/17</a:t>
+              <a:t>20/08/17</a:t>
             </a:fld>
             <a:endParaRPr lang="en-US"/>
           </a:p>
@@ -4631,7 +4631,7 @@
           <a:p>
             <a:fld id="{D88EC65B-D77A-B24E-9703-40BE60F18F63}" type="datetimeFigureOut">
               <a:rPr lang="en-US" smtClean="0"/>
-              <a:t>17/08/17</a:t>
+              <a:t>20/08/17</a:t>
             </a:fld>
             <a:endParaRPr lang="en-US"/>
           </a:p>
@@ -4841,7 +4841,7 @@
           <a:p>
             <a:fld id="{D88EC65B-D77A-B24E-9703-40BE60F18F63}" type="datetimeFigureOut">
               <a:rPr lang="en-US" smtClean="0"/>
-              <a:t>17/08/17</a:t>
+              <a:t>20/08/17</a:t>
             </a:fld>
             <a:endParaRPr lang="en-US"/>
           </a:p>
@@ -5099,7 +5099,7 @@
           <a:p>
             <a:fld id="{9861512E-2EE5-2448-AB47-1C0A5804569F}" type="datetimeFigureOut">
               <a:rPr lang="en-US" smtClean="0"/>
-              <a:t>17/08/17</a:t>
+              <a:t>20/08/17</a:t>
             </a:fld>
             <a:endParaRPr lang="en-US"/>
           </a:p>
@@ -5269,7 +5269,7 @@
           <a:p>
             <a:fld id="{9861512E-2EE5-2448-AB47-1C0A5804569F}" type="datetimeFigureOut">
               <a:rPr lang="en-US" smtClean="0"/>
-              <a:t>17/08/17</a:t>
+              <a:t>20/08/17</a:t>
             </a:fld>
             <a:endParaRPr lang="en-US"/>
           </a:p>
@@ -5515,7 +5515,7 @@
           <a:p>
             <a:fld id="{9861512E-2EE5-2448-AB47-1C0A5804569F}" type="datetimeFigureOut">
               <a:rPr lang="en-US" smtClean="0"/>
-              <a:t>17/08/17</a:t>
+              <a:t>20/08/17</a:t>
             </a:fld>
             <a:endParaRPr lang="en-US"/>
           </a:p>
@@ -5803,7 +5803,7 @@
           <a:p>
             <a:fld id="{9861512E-2EE5-2448-AB47-1C0A5804569F}" type="datetimeFigureOut">
               <a:rPr lang="en-US" smtClean="0"/>
-              <a:t>17/08/17</a:t>
+              <a:t>20/08/17</a:t>
             </a:fld>
             <a:endParaRPr lang="en-US"/>
           </a:p>
@@ -6330,7 +6330,7 @@
           <a:p>
             <a:fld id="{9861512E-2EE5-2448-AB47-1C0A5804569F}" type="datetimeFigureOut">
               <a:rPr lang="en-US" smtClean="0"/>
-              <a:t>17/08/17</a:t>
+              <a:t>20/08/17</a:t>
             </a:fld>
             <a:endParaRPr lang="en-US"/>
           </a:p>
@@ -6448,7 +6448,7 @@
           <a:p>
             <a:fld id="{9861512E-2EE5-2448-AB47-1C0A5804569F}" type="datetimeFigureOut">
               <a:rPr lang="en-US" smtClean="0"/>
-              <a:t>17/08/17</a:t>
+              <a:t>20/08/17</a:t>
             </a:fld>
             <a:endParaRPr lang="en-US"/>
           </a:p>
@@ -6543,7 +6543,7 @@
           <a:p>
             <a:fld id="{9861512E-2EE5-2448-AB47-1C0A5804569F}" type="datetimeFigureOut">
               <a:rPr lang="en-US" smtClean="0"/>
-              <a:t>17/08/17</a:t>
+              <a:t>20/08/17</a:t>
             </a:fld>
             <a:endParaRPr lang="en-US"/>
           </a:p>
@@ -6820,7 +6820,7 @@
           <a:p>
             <a:fld id="{9861512E-2EE5-2448-AB47-1C0A5804569F}" type="datetimeFigureOut">
               <a:rPr lang="en-US" smtClean="0"/>
-              <a:t>17/08/17</a:t>
+              <a:t>20/08/17</a:t>
             </a:fld>
             <a:endParaRPr lang="en-US"/>
           </a:p>
@@ -7073,7 +7073,7 @@
           <a:p>
             <a:fld id="{9861512E-2EE5-2448-AB47-1C0A5804569F}" type="datetimeFigureOut">
               <a:rPr lang="en-US" smtClean="0"/>
-              <a:t>17/08/17</a:t>
+              <a:t>20/08/17</a:t>
             </a:fld>
             <a:endParaRPr lang="en-US"/>
           </a:p>
@@ -7243,7 +7243,7 @@
           <a:p>
             <a:fld id="{9861512E-2EE5-2448-AB47-1C0A5804569F}" type="datetimeFigureOut">
               <a:rPr lang="en-US" smtClean="0"/>
-              <a:t>17/08/17</a:t>
+              <a:t>20/08/17</a:t>
             </a:fld>
             <a:endParaRPr lang="en-US"/>
           </a:p>
@@ -7423,7 +7423,7 @@
           <a:p>
             <a:fld id="{9861512E-2EE5-2448-AB47-1C0A5804569F}" type="datetimeFigureOut">
               <a:rPr lang="en-US" smtClean="0"/>
-              <a:t>17/08/17</a:t>
+              <a:t>20/08/17</a:t>
             </a:fld>
             <a:endParaRPr lang="en-US"/>
           </a:p>
@@ -9703,7 +9703,7 @@
           <a:p>
             <a:fld id="{9861512E-2EE5-2448-AB47-1C0A5804569F}" type="datetimeFigureOut">
               <a:rPr lang="en-US" smtClean="0"/>
-              <a:t>17/08/17</a:t>
+              <a:t>20/08/17</a:t>
             </a:fld>
             <a:endParaRPr lang="en-US"/>
           </a:p>
@@ -10354,17 +10354,7 @@
                   </a:schemeClr>
                 </a:solidFill>
               </a:rPr>
-              <a:t>Jan </a:t>
-            </a:r>
-            <a:r>
-              <a:rPr lang="en-US" sz="2000" dirty="0" smtClean="0">
-                <a:solidFill>
-                  <a:schemeClr val="bg1">
-                    <a:lumMod val="65000"/>
-                  </a:schemeClr>
-                </a:solidFill>
-              </a:rPr>
-              <a:t>Kwakkel, Caitlin Spence, and Klaus Keller</a:t>
+              <a:t>Jan Kwakkel, Caitlin Spence, and Klaus Keller</a:t>
             </a:r>
             <a:endParaRPr lang="en-US" sz="2000" dirty="0">
               <a:solidFill>
@@ -11185,30 +11175,119 @@
           <a:bodyPr/>
           <a:lstStyle/>
           <a:p>
-            <a:endParaRPr lang="en-US"/>
-          </a:p>
-        </p:txBody>
-      </p:sp>
-      <p:sp>
-        <p:nvSpPr>
-          <p:cNvPr id="3" name="Content Placeholder 2"/>
-          <p:cNvSpPr>
-            <a:spLocks noGrp="1"/>
-          </p:cNvSpPr>
-          <p:nvPr>
-            <p:ph idx="1"/>
-          </p:nvPr>
-        </p:nvSpPr>
-        <p:spPr/>
-        <p:txBody>
-          <a:bodyPr/>
+            <a:r>
+              <a:rPr lang="en-US" dirty="0" smtClean="0"/>
+              <a:t>Endogenous learning</a:t>
+            </a:r>
+            <a:endParaRPr lang="en-US" dirty="0"/>
+          </a:p>
+        </p:txBody>
+      </p:sp>
+      <p:pic>
+        <p:nvPicPr>
+          <p:cNvPr id="4" name="Picture 3"/>
+          <p:cNvPicPr>
+            <a:picLocks noChangeAspect="1"/>
+          </p:cNvPicPr>
+          <p:nvPr/>
+        </p:nvPicPr>
+        <p:blipFill>
+          <a:blip r:embed="rId2">
+            <a:extLst>
+              <a:ext uri="{28A0092B-C50C-407E-A947-70E740481C1C}">
+                <a14:useLocalDpi xmlns:a14="http://schemas.microsoft.com/office/drawing/2010/main" val="0"/>
+              </a:ext>
+            </a:extLst>
+          </a:blip>
+          <a:stretch>
+            <a:fillRect/>
+          </a:stretch>
+        </p:blipFill>
+        <p:spPr>
+          <a:xfrm>
+            <a:off x="2325936" y="1492423"/>
+            <a:ext cx="10225136" cy="7576457"/>
+          </a:xfrm>
+          <a:prstGeom prst="rect">
+            <a:avLst/>
+          </a:prstGeom>
+        </p:spPr>
+      </p:pic>
+      <p:sp>
+        <p:nvSpPr>
+          <p:cNvPr id="5" name="TextBox 4"/>
+          <p:cNvSpPr txBox="1"/>
+          <p:nvPr/>
+        </p:nvSpPr>
+        <p:spPr>
+          <a:xfrm>
+            <a:off x="2253928" y="9116560"/>
+            <a:ext cx="9505056" cy="369332"/>
+          </a:xfrm>
+          <a:prstGeom prst="rect">
+            <a:avLst/>
+          </a:prstGeom>
+          <a:noFill/>
+        </p:spPr>
+        <p:txBody>
+          <a:bodyPr wrap="square" rtlCol="0">
+            <a:spAutoFit/>
+          </a:bodyPr>
           <a:lstStyle/>
           <a:p>
             <a:r>
-              <a:rPr lang="en-US" dirty="0" smtClean="0"/>
-              <a:t>Endogenous learning </a:t>
-            </a:r>
-            <a:endParaRPr lang="en-US" dirty="0"/>
+              <a:rPr lang="en-US" sz="1800" dirty="0" smtClean="0">
+                <a:solidFill>
+                  <a:srgbClr val="A6A6A6"/>
+                </a:solidFill>
+              </a:rPr>
+              <a:t>Quinn et </a:t>
+            </a:r>
+            <a:r>
+              <a:rPr lang="en-US" sz="1800" dirty="0" smtClean="0">
+                <a:solidFill>
+                  <a:srgbClr val="A6A6A6"/>
+                </a:solidFill>
+              </a:rPr>
+              <a:t>al (</a:t>
+            </a:r>
+            <a:r>
+              <a:rPr lang="en-US" sz="1800" dirty="0" smtClean="0">
+                <a:solidFill>
+                  <a:srgbClr val="A6A6A6"/>
+                </a:solidFill>
+              </a:rPr>
+              <a:t>2017) </a:t>
+            </a:r>
+            <a:r>
+              <a:rPr lang="en-US" sz="1800" dirty="0" err="1" smtClean="0">
+                <a:solidFill>
+                  <a:srgbClr val="A6A6A6"/>
+                </a:solidFill>
+              </a:rPr>
+              <a:t>doi</a:t>
+            </a:r>
+            <a:r>
+              <a:rPr lang="en-US" sz="1800" dirty="0" smtClean="0">
+                <a:solidFill>
+                  <a:srgbClr val="A6A6A6"/>
+                </a:solidFill>
+              </a:rPr>
+              <a:t> </a:t>
+            </a:r>
+            <a:r>
+              <a:rPr lang="hr-HR" sz="1800" dirty="0">
+                <a:solidFill>
+                  <a:srgbClr val="A6A6A6"/>
+                </a:solidFill>
+              </a:rPr>
+              <a:t>10.1016/j.envsoft.2017.02.017</a:t>
+            </a:r>
+            <a:endParaRPr lang="en-US" sz="1800" dirty="0">
+              <a:solidFill>
+                <a:srgbClr val="A6A6A6"/>
+              </a:solidFill>
+            </a:endParaRPr>
           </a:p>
         </p:txBody>
       </p:sp>
@@ -11284,7 +11363,7 @@
         <p:spPr>
           <a:xfrm>
             <a:off x="2037904" y="2126320"/>
-            <a:ext cx="11007328" cy="6134856"/>
+            <a:ext cx="10966896" cy="6134856"/>
           </a:xfrm>
           <a:prstGeom prst="rect">
             <a:avLst/>
@@ -11541,16 +11620,6 @@
               </a:rPr>
               <a:t>Do we know this exactly?</a:t>
             </a:r>
-            <a:endParaRPr kumimoji="0" lang="en-US" sz="2400" b="0" i="0" u="none" strike="noStrike" cap="none" normalizeH="0" baseline="0" dirty="0" smtClean="0">
-              <a:ln>
-                <a:noFill/>
-              </a:ln>
-              <a:solidFill>
-                <a:schemeClr val="bg1"/>
-              </a:solidFill>
-              <a:latin typeface="Arial" charset="0"/>
-              <a:ea typeface="ＭＳ Ｐゴシック" pitchFamily="1" charset="-128"/>
-            </a:endParaRPr>
           </a:p>
         </p:txBody>
       </p:sp>
@@ -11621,16 +11690,6 @@
               </a:rPr>
               <a:t>How to discount this over time?</a:t>
             </a:r>
-            <a:endParaRPr kumimoji="0" lang="en-US" sz="2400" b="0" i="0" u="none" strike="noStrike" cap="none" normalizeH="0" baseline="0" dirty="0" smtClean="0">
-              <a:ln>
-                <a:noFill/>
-              </a:ln>
-              <a:solidFill>
-                <a:schemeClr val="bg1"/>
-              </a:solidFill>
-              <a:latin typeface="Arial" charset="0"/>
-              <a:ea typeface="ＭＳ Ｐゴシック" pitchFamily="1" charset="-128"/>
-            </a:endParaRPr>
           </a:p>
         </p:txBody>
       </p:sp>
@@ -11686,6 +11745,11 @@
           <a:bodyPr/>
           <a:lstStyle/>
           <a:p>
+            <a:pPr marL="1216025" indent="-1216025"/>
+            <a:r>
+              <a:rPr lang="en-US" dirty="0" smtClean="0"/>
+              <a:t>Deep Uncertainty re-evaluation</a:t>
+            </a:r>
             <a:endParaRPr lang="en-US" dirty="0"/>
           </a:p>
         </p:txBody>

</xml_diff>